<commit_message>
Updated schematics, plotting code; added equivalence test code for allocation protocols
</commit_message>
<xml_diff>
--- a/Schematics/MemoryTaskSchem.pptx
+++ b/Schematics/MemoryTaskSchem.pptx
@@ -243,7 +243,7 @@
           <a:p>
             <a:fld id="{55B224CF-73BE-D84C-91AC-8A223FA3AEB9}" type="datetimeFigureOut">
               <a:rPr lang="en-US" smtClean="0"/>
-              <a:t>12/15/25</a:t>
+              <a:t>12/27/25</a:t>
             </a:fld>
             <a:endParaRPr lang="en-US"/>
           </a:p>
@@ -413,7 +413,7 @@
           <a:p>
             <a:fld id="{55B224CF-73BE-D84C-91AC-8A223FA3AEB9}" type="datetimeFigureOut">
               <a:rPr lang="en-US" smtClean="0"/>
-              <a:t>12/15/25</a:t>
+              <a:t>12/27/25</a:t>
             </a:fld>
             <a:endParaRPr lang="en-US"/>
           </a:p>
@@ -593,7 +593,7 @@
           <a:p>
             <a:fld id="{55B224CF-73BE-D84C-91AC-8A223FA3AEB9}" type="datetimeFigureOut">
               <a:rPr lang="en-US" smtClean="0"/>
-              <a:t>12/15/25</a:t>
+              <a:t>12/27/25</a:t>
             </a:fld>
             <a:endParaRPr lang="en-US"/>
           </a:p>
@@ -763,7 +763,7 @@
           <a:p>
             <a:fld id="{55B224CF-73BE-D84C-91AC-8A223FA3AEB9}" type="datetimeFigureOut">
               <a:rPr lang="en-US" smtClean="0"/>
-              <a:t>12/15/25</a:t>
+              <a:t>12/27/25</a:t>
             </a:fld>
             <a:endParaRPr lang="en-US"/>
           </a:p>
@@ -1007,7 +1007,7 @@
           <a:p>
             <a:fld id="{55B224CF-73BE-D84C-91AC-8A223FA3AEB9}" type="datetimeFigureOut">
               <a:rPr lang="en-US" smtClean="0"/>
-              <a:t>12/15/25</a:t>
+              <a:t>12/27/25</a:t>
             </a:fld>
             <a:endParaRPr lang="en-US"/>
           </a:p>
@@ -1239,7 +1239,7 @@
           <a:p>
             <a:fld id="{55B224CF-73BE-D84C-91AC-8A223FA3AEB9}" type="datetimeFigureOut">
               <a:rPr lang="en-US" smtClean="0"/>
-              <a:t>12/15/25</a:t>
+              <a:t>12/27/25</a:t>
             </a:fld>
             <a:endParaRPr lang="en-US"/>
           </a:p>
@@ -1606,7 +1606,7 @@
           <a:p>
             <a:fld id="{55B224CF-73BE-D84C-91AC-8A223FA3AEB9}" type="datetimeFigureOut">
               <a:rPr lang="en-US" smtClean="0"/>
-              <a:t>12/15/25</a:t>
+              <a:t>12/27/25</a:t>
             </a:fld>
             <a:endParaRPr lang="en-US"/>
           </a:p>
@@ -1724,7 +1724,7 @@
           <a:p>
             <a:fld id="{55B224CF-73BE-D84C-91AC-8A223FA3AEB9}" type="datetimeFigureOut">
               <a:rPr lang="en-US" smtClean="0"/>
-              <a:t>12/15/25</a:t>
+              <a:t>12/27/25</a:t>
             </a:fld>
             <a:endParaRPr lang="en-US"/>
           </a:p>
@@ -1819,7 +1819,7 @@
           <a:p>
             <a:fld id="{55B224CF-73BE-D84C-91AC-8A223FA3AEB9}" type="datetimeFigureOut">
               <a:rPr lang="en-US" smtClean="0"/>
-              <a:t>12/15/25</a:t>
+              <a:t>12/27/25</a:t>
             </a:fld>
             <a:endParaRPr lang="en-US"/>
           </a:p>
@@ -2096,7 +2096,7 @@
           <a:p>
             <a:fld id="{55B224CF-73BE-D84C-91AC-8A223FA3AEB9}" type="datetimeFigureOut">
               <a:rPr lang="en-US" smtClean="0"/>
-              <a:t>12/15/25</a:t>
+              <a:t>12/27/25</a:t>
             </a:fld>
             <a:endParaRPr lang="en-US"/>
           </a:p>
@@ -2353,7 +2353,7 @@
           <a:p>
             <a:fld id="{55B224CF-73BE-D84C-91AC-8A223FA3AEB9}" type="datetimeFigureOut">
               <a:rPr lang="en-US" smtClean="0"/>
-              <a:t>12/15/25</a:t>
+              <a:t>12/27/25</a:t>
             </a:fld>
             <a:endParaRPr lang="en-US"/>
           </a:p>
@@ -2566,7 +2566,7 @@
           <a:p>
             <a:fld id="{55B224CF-73BE-D84C-91AC-8A223FA3AEB9}" type="datetimeFigureOut">
               <a:rPr lang="en-US" smtClean="0"/>
-              <a:t>12/15/25</a:t>
+              <a:t>12/27/25</a:t>
             </a:fld>
             <a:endParaRPr lang="en-US"/>
           </a:p>
@@ -4450,17 +4450,15 @@
             </p:nvCxnSpPr>
             <p:spPr>
               <a:xfrm flipH="1">
-                <a:off x="6627462" y="2621010"/>
-                <a:ext cx="7223760" cy="0"/>
+                <a:off x="6554271" y="2621010"/>
+                <a:ext cx="7296951" cy="0"/>
               </a:xfrm>
               <a:prstGeom prst="line">
                 <a:avLst/>
               </a:prstGeom>
-              <a:ln w="19050">
-                <a:solidFill>
-                  <a:schemeClr val="bg2">
-                    <a:lumMod val="25000"/>
-                  </a:schemeClr>
+              <a:ln w="38100">
+                <a:solidFill>
+                  <a:schemeClr val="tx1"/>
                 </a:solidFill>
                 <a:prstDash val="sysDot"/>
               </a:ln>
@@ -7371,7 +7369,9 @@
                   <a:avLst/>
                 </a:prstGeom>
                 <a:solidFill>
-                  <a:schemeClr val="bg1"/>
+                  <a:schemeClr val="bg2">
+                    <a:lumMod val="50000"/>
+                  </a:schemeClr>
                 </a:solidFill>
                 <a:ln w="6350">
                   <a:solidFill>
@@ -7403,7 +7403,7 @@
                   <a:r>
                     <a:rPr lang="en-US" sz="2400" dirty="0">
                       <a:solidFill>
-                        <a:schemeClr val="tx1"/>
+                        <a:schemeClr val="bg1"/>
                       </a:solidFill>
                       <a:latin typeface="Aptos" panose="020B0004020202020204" pitchFamily="34" charset="0"/>
                     </a:rPr>
@@ -7489,17 +7489,15 @@
             </p:nvCxnSpPr>
             <p:spPr>
               <a:xfrm flipH="1">
-                <a:off x="6636202" y="4480436"/>
-                <a:ext cx="7223760" cy="0"/>
+                <a:off x="6550560" y="4480436"/>
+                <a:ext cx="7309402" cy="0"/>
               </a:xfrm>
               <a:prstGeom prst="line">
                 <a:avLst/>
               </a:prstGeom>
-              <a:ln w="19050">
-                <a:solidFill>
-                  <a:schemeClr val="bg2">
-                    <a:lumMod val="25000"/>
-                  </a:schemeClr>
+              <a:ln w="38100">
+                <a:solidFill>
+                  <a:schemeClr val="tx1"/>
                 </a:solidFill>
                 <a:prstDash val="sysDot"/>
               </a:ln>
@@ -7616,7 +7614,10 @@
                   <a:avLst/>
                 </a:prstGeom>
                 <a:solidFill>
-                  <a:schemeClr val="bg1"/>
+                  <a:schemeClr val="bg2">
+                    <a:lumMod val="50000"/>
+                    <a:alpha val="67000"/>
+                  </a:schemeClr>
                 </a:solidFill>
                 <a:ln w="22225">
                   <a:solidFill>
@@ -7782,7 +7783,10 @@
                   <a:avLst/>
                 </a:prstGeom>
                 <a:solidFill>
-                  <a:schemeClr val="bg1"/>
+                  <a:schemeClr val="bg2">
+                    <a:lumMod val="50000"/>
+                    <a:alpha val="67000"/>
+                  </a:schemeClr>
                 </a:solidFill>
                 <a:ln w="22225">
                   <a:solidFill>
@@ -7948,7 +7952,10 @@
                   <a:avLst/>
                 </a:prstGeom>
                 <a:solidFill>
-                  <a:schemeClr val="bg1"/>
+                  <a:schemeClr val="bg2">
+                    <a:lumMod val="50000"/>
+                    <a:alpha val="67000"/>
+                  </a:schemeClr>
                 </a:solidFill>
                 <a:ln w="22225">
                   <a:solidFill>
@@ -8282,7 +8289,10 @@
                   <a:avLst/>
                 </a:prstGeom>
                 <a:solidFill>
-                  <a:schemeClr val="bg1"/>
+                  <a:schemeClr val="bg2">
+                    <a:lumMod val="50000"/>
+                    <a:alpha val="67000"/>
+                  </a:schemeClr>
                 </a:solidFill>
                 <a:ln w="22225">
                   <a:solidFill>
@@ -8336,7 +8346,10 @@
                   <a:avLst/>
                 </a:prstGeom>
                 <a:solidFill>
-                  <a:schemeClr val="bg1"/>
+                  <a:schemeClr val="bg2">
+                    <a:lumMod val="50000"/>
+                    <a:alpha val="67000"/>
+                  </a:schemeClr>
                 </a:solidFill>
                 <a:ln w="22225">
                   <a:solidFill>
@@ -8465,7 +8478,9 @@
                   <a:avLst/>
                 </a:prstGeom>
                 <a:solidFill>
-                  <a:schemeClr val="bg1"/>
+                  <a:schemeClr val="bg2">
+                    <a:lumMod val="50000"/>
+                  </a:schemeClr>
                 </a:solidFill>
                 <a:ln w="22225">
                   <a:solidFill>
@@ -8627,7 +8642,9 @@
                   <a:avLst/>
                 </a:prstGeom>
                 <a:solidFill>
-                  <a:schemeClr val="bg1"/>
+                  <a:schemeClr val="bg2">
+                    <a:lumMod val="50000"/>
+                  </a:schemeClr>
                 </a:solidFill>
                 <a:ln w="22225">
                   <a:solidFill>
@@ -8789,7 +8806,9 @@
                   <a:avLst/>
                 </a:prstGeom>
                 <a:solidFill>
-                  <a:schemeClr val="bg1"/>
+                  <a:schemeClr val="bg2">
+                    <a:lumMod val="50000"/>
+                  </a:schemeClr>
                 </a:solidFill>
                 <a:ln w="22225">
                   <a:solidFill>
@@ -9113,7 +9132,9 @@
                   <a:avLst/>
                 </a:prstGeom>
                 <a:solidFill>
-                  <a:schemeClr val="bg1"/>
+                  <a:schemeClr val="bg2">
+                    <a:lumMod val="50000"/>
+                  </a:schemeClr>
                 </a:solidFill>
                 <a:ln w="22225">
                   <a:solidFill>
@@ -9167,7 +9188,9 @@
                   <a:avLst/>
                 </a:prstGeom>
                 <a:solidFill>
-                  <a:schemeClr val="bg1"/>
+                  <a:schemeClr val="bg2">
+                    <a:lumMod val="50000"/>
+                  </a:schemeClr>
                 </a:solidFill>
                 <a:ln w="22225">
                   <a:solidFill>
@@ -10545,17 +10568,15 @@
           </p:nvCxnSpPr>
           <p:spPr>
             <a:xfrm flipH="1">
-              <a:off x="6634255" y="7324024"/>
-              <a:ext cx="7223760" cy="0"/>
+              <a:off x="6550560" y="7324024"/>
+              <a:ext cx="7307455" cy="0"/>
             </a:xfrm>
             <a:prstGeom prst="line">
               <a:avLst/>
             </a:prstGeom>
-            <a:ln w="19050">
+            <a:ln w="38100">
               <a:solidFill>
-                <a:schemeClr val="bg2">
-                  <a:lumMod val="25000"/>
-                </a:schemeClr>
+                <a:schemeClr val="tx1"/>
               </a:solidFill>
               <a:prstDash val="sysDot"/>
             </a:ln>

</xml_diff>